<commit_message>
Replotted 4 class loss
</commit_message>
<xml_diff>
--- a/training_results_4_class.pptx
+++ b/training_results_4_class.pptx
@@ -11,12 +11,6 @@
     <p:sldId id="259" r:id="rId10"/>
     <p:sldId id="260" r:id="rId11"/>
     <p:sldId id="261" r:id="rId12"/>
-    <p:sldId id="262" r:id="rId13"/>
-    <p:sldId id="263" r:id="rId14"/>
-    <p:sldId id="264" r:id="rId15"/>
-    <p:sldId id="265" r:id="rId16"/>
-    <p:sldId id="266" r:id="rId17"/>
-    <p:sldId id="267" r:id="rId18"/>
   </p:sldIdLst>
   <p:sldSz cx="9144000" cy="6858000" type="screen4x3"/>
   <p:notesSz cx="6858000" cy="9144000"/>
@@ -3101,133 +3095,7 @@
       <p:grpSpPr/>
       <p:pic>
         <p:nvPicPr>
-          <p:cNvPr id="2" name="Picture 1" descr="truncated_b0_leaky_reduced_layers_0_2025-03-02_22-36.png"/>
-          <p:cNvPicPr>
-            <a:picLocks noChangeAspect="1"/>
-          </p:cNvPicPr>
-          <p:nvPr/>
-        </p:nvPicPr>
-        <p:blipFill>
-          <a:blip r:embed="rId2"/>
-          <a:stretch>
-            <a:fillRect/>
-          </a:stretch>
-        </p:blipFill>
-        <p:spPr>
-          <a:xfrm>
-            <a:off x="914400" y="1371600"/>
-            <a:ext cx="7315200" cy="5486400"/>
-          </a:xfrm>
-          <a:prstGeom prst="rect">
-            <a:avLst/>
-          </a:prstGeom>
-        </p:spPr>
-      </p:pic>
-    </p:spTree>
-  </p:cSld>
-  <p:clrMapOvr>
-    <a:masterClrMapping/>
-  </p:clrMapOvr>
-</p:sld>
-</file>
-
-<file path=ppt/slides/slide10.xml><?xml version="1.0" encoding="utf-8"?>
-<p:sld xmlns:a="http://schemas.openxmlformats.org/drawingml/2006/main" xmlns:p="http://schemas.openxmlformats.org/presentationml/2006/main" xmlns:r="http://schemas.openxmlformats.org/officeDocument/2006/relationships">
-  <p:cSld>
-    <p:spTree>
-      <p:nvGrpSpPr>
-        <p:cNvPr id="1" name=""/>
-        <p:cNvGrpSpPr/>
-        <p:nvPr/>
-      </p:nvGrpSpPr>
-      <p:grpSpPr/>
-      <p:pic>
-        <p:nvPicPr>
-          <p:cNvPr id="2" name="Picture 1" descr="truncated_b0_reduced_layers_3_2025-03-02_19-25.png"/>
-          <p:cNvPicPr>
-            <a:picLocks noChangeAspect="1"/>
-          </p:cNvPicPr>
-          <p:nvPr/>
-        </p:nvPicPr>
-        <p:blipFill>
-          <a:blip r:embed="rId2"/>
-          <a:stretch>
-            <a:fillRect/>
-          </a:stretch>
-        </p:blipFill>
-        <p:spPr>
-          <a:xfrm>
-            <a:off x="914400" y="1371600"/>
-            <a:ext cx="7315200" cy="5486400"/>
-          </a:xfrm>
-          <a:prstGeom prst="rect">
-            <a:avLst/>
-          </a:prstGeom>
-        </p:spPr>
-      </p:pic>
-    </p:spTree>
-  </p:cSld>
-  <p:clrMapOvr>
-    <a:masterClrMapping/>
-  </p:clrMapOvr>
-</p:sld>
-</file>
-
-<file path=ppt/slides/slide11.xml><?xml version="1.0" encoding="utf-8"?>
-<p:sld xmlns:a="http://schemas.openxmlformats.org/drawingml/2006/main" xmlns:p="http://schemas.openxmlformats.org/presentationml/2006/main" xmlns:r="http://schemas.openxmlformats.org/officeDocument/2006/relationships">
-  <p:cSld>
-    <p:spTree>
-      <p:nvGrpSpPr>
-        <p:cNvPr id="1" name=""/>
-        <p:cNvGrpSpPr/>
-        <p:nvPr/>
-      </p:nvGrpSpPr>
-      <p:grpSpPr/>
-      <p:pic>
-        <p:nvPicPr>
-          <p:cNvPr id="2" name="Picture 1" descr="truncated_b0_reduced_layers_4_2025-03-02_21-05.png"/>
-          <p:cNvPicPr>
-            <a:picLocks noChangeAspect="1"/>
-          </p:cNvPicPr>
-          <p:nvPr/>
-        </p:nvPicPr>
-        <p:blipFill>
-          <a:blip r:embed="rId2"/>
-          <a:stretch>
-            <a:fillRect/>
-          </a:stretch>
-        </p:blipFill>
-        <p:spPr>
-          <a:xfrm>
-            <a:off x="914400" y="1371600"/>
-            <a:ext cx="7315200" cy="5486400"/>
-          </a:xfrm>
-          <a:prstGeom prst="rect">
-            <a:avLst/>
-          </a:prstGeom>
-        </p:spPr>
-      </p:pic>
-    </p:spTree>
-  </p:cSld>
-  <p:clrMapOvr>
-    <a:masterClrMapping/>
-  </p:clrMapOvr>
-</p:sld>
-</file>
-
-<file path=ppt/slides/slide12.xml><?xml version="1.0" encoding="utf-8"?>
-<p:sld xmlns:a="http://schemas.openxmlformats.org/drawingml/2006/main" xmlns:p="http://schemas.openxmlformats.org/presentationml/2006/main" xmlns:r="http://schemas.openxmlformats.org/officeDocument/2006/relationships">
-  <p:cSld>
-    <p:spTree>
-      <p:nvGrpSpPr>
-        <p:cNvPr id="1" name=""/>
-        <p:cNvGrpSpPr/>
-        <p:nvPr/>
-      </p:nvGrpSpPr>
-      <p:grpSpPr/>
-      <p:pic>
-        <p:nvPicPr>
-          <p:cNvPr id="2" name="Picture 1" descr="truncated_b0_reduced_layers_5_2025-03-03_16-24.png"/>
+          <p:cNvPr id="2" name="Picture 1" descr="truncated_b0_reduced_layers_0_2025-03-03_19-14.png"/>
           <p:cNvPicPr>
             <a:picLocks noChangeAspect="1"/>
           </p:cNvPicPr>
@@ -3269,7 +3137,7 @@
       <p:grpSpPr/>
       <p:pic>
         <p:nvPicPr>
-          <p:cNvPr id="2" name="Picture 1" descr="truncated_b0_leaky_reduced_layers_1_2025-03-03_00-40.png"/>
+          <p:cNvPr id="2" name="Picture 1" descr="truncated_b0_reduced_layers_1_2025-03-03_21-55.png"/>
           <p:cNvPicPr>
             <a:picLocks noChangeAspect="1"/>
           </p:cNvPicPr>
@@ -3311,7 +3179,7 @@
       <p:grpSpPr/>
       <p:pic>
         <p:nvPicPr>
-          <p:cNvPr id="2" name="Picture 1" descr="truncated_b0_leaky_reduced_layers_2_2025-03-03_02-36.png"/>
+          <p:cNvPr id="2" name="Picture 1" descr="truncated_b0_reduced_layers_2_2025-03-04_00-23.png"/>
           <p:cNvPicPr>
             <a:picLocks noChangeAspect="1"/>
           </p:cNvPicPr>
@@ -3353,7 +3221,7 @@
       <p:grpSpPr/>
       <p:pic>
         <p:nvPicPr>
-          <p:cNvPr id="2" name="Picture 1" descr="truncated_b0_leaky_reduced_layers_3_2025-03-03_04-20.png"/>
+          <p:cNvPr id="2" name="Picture 1" descr="truncated_b0_reduced_layers_3_2025-03-04_02-36.png"/>
           <p:cNvPicPr>
             <a:picLocks noChangeAspect="1"/>
           </p:cNvPicPr>
@@ -3395,7 +3263,7 @@
       <p:grpSpPr/>
       <p:pic>
         <p:nvPicPr>
-          <p:cNvPr id="2" name="Picture 1" descr="truncated_b0_leaky_reduced_layers_4_2025-03-03_06-00.png"/>
+          <p:cNvPr id="2" name="Picture 1" descr="truncated_b0_reduced_layers_4_2025-03-04_04-40.png"/>
           <p:cNvPicPr>
             <a:picLocks noChangeAspect="1"/>
           </p:cNvPicPr>
@@ -3437,133 +3305,7 @@
       <p:grpSpPr/>
       <p:pic>
         <p:nvPicPr>
-          <p:cNvPr id="2" name="Picture 1" descr="truncated_b0_leaky_reduced_layers_5_2025-03-03_17-53.png"/>
-          <p:cNvPicPr>
-            <a:picLocks noChangeAspect="1"/>
-          </p:cNvPicPr>
-          <p:nvPr/>
-        </p:nvPicPr>
-        <p:blipFill>
-          <a:blip r:embed="rId2"/>
-          <a:stretch>
-            <a:fillRect/>
-          </a:stretch>
-        </p:blipFill>
-        <p:spPr>
-          <a:xfrm>
-            <a:off x="914400" y="1371600"/>
-            <a:ext cx="7315200" cy="5486400"/>
-          </a:xfrm>
-          <a:prstGeom prst="rect">
-            <a:avLst/>
-          </a:prstGeom>
-        </p:spPr>
-      </p:pic>
-    </p:spTree>
-  </p:cSld>
-  <p:clrMapOvr>
-    <a:masterClrMapping/>
-  </p:clrMapOvr>
-</p:sld>
-</file>
-
-<file path=ppt/slides/slide7.xml><?xml version="1.0" encoding="utf-8"?>
-<p:sld xmlns:a="http://schemas.openxmlformats.org/drawingml/2006/main" xmlns:p="http://schemas.openxmlformats.org/presentationml/2006/main" xmlns:r="http://schemas.openxmlformats.org/officeDocument/2006/relationships">
-  <p:cSld>
-    <p:spTree>
-      <p:nvGrpSpPr>
-        <p:cNvPr id="1" name=""/>
-        <p:cNvGrpSpPr/>
-        <p:nvPr/>
-      </p:nvGrpSpPr>
-      <p:grpSpPr/>
-      <p:pic>
-        <p:nvPicPr>
-          <p:cNvPr id="2" name="Picture 1" descr="truncated_b0_reduced_layers_0_2025-03-02_13-35.png"/>
-          <p:cNvPicPr>
-            <a:picLocks noChangeAspect="1"/>
-          </p:cNvPicPr>
-          <p:nvPr/>
-        </p:nvPicPr>
-        <p:blipFill>
-          <a:blip r:embed="rId2"/>
-          <a:stretch>
-            <a:fillRect/>
-          </a:stretch>
-        </p:blipFill>
-        <p:spPr>
-          <a:xfrm>
-            <a:off x="914400" y="1371600"/>
-            <a:ext cx="7315200" cy="5486400"/>
-          </a:xfrm>
-          <a:prstGeom prst="rect">
-            <a:avLst/>
-          </a:prstGeom>
-        </p:spPr>
-      </p:pic>
-    </p:spTree>
-  </p:cSld>
-  <p:clrMapOvr>
-    <a:masterClrMapping/>
-  </p:clrMapOvr>
-</p:sld>
-</file>
-
-<file path=ppt/slides/slide8.xml><?xml version="1.0" encoding="utf-8"?>
-<p:sld xmlns:a="http://schemas.openxmlformats.org/drawingml/2006/main" xmlns:p="http://schemas.openxmlformats.org/presentationml/2006/main" xmlns:r="http://schemas.openxmlformats.org/officeDocument/2006/relationships">
-  <p:cSld>
-    <p:spTree>
-      <p:nvGrpSpPr>
-        <p:cNvPr id="1" name=""/>
-        <p:cNvGrpSpPr/>
-        <p:nvPr/>
-      </p:nvGrpSpPr>
-      <p:grpSpPr/>
-      <p:pic>
-        <p:nvPicPr>
-          <p:cNvPr id="2" name="Picture 1" descr="truncated_b0_reduced_layers_1_2025-03-02_15-45.png"/>
-          <p:cNvPicPr>
-            <a:picLocks noChangeAspect="1"/>
-          </p:cNvPicPr>
-          <p:nvPr/>
-        </p:nvPicPr>
-        <p:blipFill>
-          <a:blip r:embed="rId2"/>
-          <a:stretch>
-            <a:fillRect/>
-          </a:stretch>
-        </p:blipFill>
-        <p:spPr>
-          <a:xfrm>
-            <a:off x="914400" y="1371600"/>
-            <a:ext cx="7315200" cy="5486400"/>
-          </a:xfrm>
-          <a:prstGeom prst="rect">
-            <a:avLst/>
-          </a:prstGeom>
-        </p:spPr>
-      </p:pic>
-    </p:spTree>
-  </p:cSld>
-  <p:clrMapOvr>
-    <a:masterClrMapping/>
-  </p:clrMapOvr>
-</p:sld>
-</file>
-
-<file path=ppt/slides/slide9.xml><?xml version="1.0" encoding="utf-8"?>
-<p:sld xmlns:a="http://schemas.openxmlformats.org/drawingml/2006/main" xmlns:p="http://schemas.openxmlformats.org/presentationml/2006/main" xmlns:r="http://schemas.openxmlformats.org/officeDocument/2006/relationships">
-  <p:cSld>
-    <p:spTree>
-      <p:nvGrpSpPr>
-        <p:cNvPr id="1" name=""/>
-        <p:cNvGrpSpPr/>
-        <p:nvPr/>
-      </p:nvGrpSpPr>
-      <p:grpSpPr/>
-      <p:pic>
-        <p:nvPicPr>
-          <p:cNvPr id="2" name="Picture 1" descr="truncated_b0_reduced_layers_2_2025-03-02_17-40.png"/>
+          <p:cNvPr id="2" name="Picture 1" descr="truncated_b0_reduced_layers_5_2025-03-04_06-31.png"/>
           <p:cNvPicPr>
             <a:picLocks noChangeAspect="1"/>
           </p:cNvPicPr>

</xml_diff>